<commit_message>
refactoring and advanced testing ready to be reviewed
</commit_message>
<xml_diff>
--- a/refactoring.pptx
+++ b/refactoring.pptx
@@ -294,7 +294,7 @@
           <a:p>
             <a:fld id="{0B842F42-2CE9-4E35-95C1-410DC08A50B1}" type="datetimeFigureOut">
               <a:rPr lang="en-US" smtClean="0"/>
-              <a:t>9/2/21</a:t>
+              <a:t>9/7/21</a:t>
             </a:fld>
             <a:endParaRPr lang="en-US"/>
           </a:p>
@@ -459,7 +459,7 @@
           <a:p>
             <a:fld id="{6F282904-F315-4730-8D91-37D99E141A6F}" type="datetimeFigureOut">
               <a:rPr lang="en-US" smtClean="0"/>
-              <a:t>9/2/21</a:t>
+              <a:t>9/7/21</a:t>
             </a:fld>
             <a:endParaRPr lang="en-US"/>
           </a:p>
@@ -32197,15 +32197,6 @@
 </file>
 
 <file path=customXml/item1.xml><?xml version="1.0" encoding="utf-8"?>
-<?mso-contentType ?>
-<FormTemplates xmlns="http://schemas.microsoft.com/sharepoint/v3/contenttype/forms">
-  <Display>DocumentLibraryForm</Display>
-  <Edit>DocumentLibraryForm</Edit>
-  <New>DocumentLibraryForm</New>
-</FormTemplates>
-</file>
-
-<file path=customXml/item2.xml><?xml version="1.0" encoding="utf-8"?>
 <ct:contentTypeSchema xmlns:ct="http://schemas.microsoft.com/office/2006/metadata/contentType" xmlns:ma="http://schemas.microsoft.com/office/2006/metadata/properties/metaAttributes" ct:_="" ma:_="" ma:contentTypeName="Document" ma:contentTypeID="0x010100565464437F680748A68B85EB6594EA7D" ma:contentTypeVersion="0" ma:contentTypeDescription="Create a new document." ma:contentTypeScope="" ma:versionID="fe3f4dd58d5914c51cfc6deaa8ad845c">
   <xsd:schema xmlns:xsd="http://www.w3.org/2001/XMLSchema" xmlns:p="http://schemas.microsoft.com/office/2006/metadata/properties" targetNamespace="http://schemas.microsoft.com/office/2006/metadata/properties" ma:root="true" ma:fieldsID="4aeb20c0e3442673af7ee10786458764">
     <xsd:element name="properties">
@@ -32254,21 +32245,22 @@
 </ct:contentTypeSchema>
 </file>
 
-<file path=customXml/item3.xml><?xml version="1.0" encoding="utf-8"?>
+<file path=customXml/item2.xml><?xml version="1.0" encoding="utf-8"?>
 <p:properties xmlns:p="http://schemas.microsoft.com/office/2006/metadata/properties" xmlns:xsi="http://www.w3.org/2001/XMLSchema-instance" xmlns:pc="http://schemas.microsoft.com/office/infopath/2007/PartnerControls">
   <documentManagement/>
 </p:properties>
 </file>
 
-<file path=customXml/itemProps1.xml><?xml version="1.0" encoding="utf-8"?>
-<ds:datastoreItem xmlns:ds="http://schemas.openxmlformats.org/officeDocument/2006/customXml" ds:itemID="{19E20559-B232-4371-8690-E3D8007EDB82}">
-  <ds:schemaRefs>
-    <ds:schemaRef ds:uri="http://schemas.microsoft.com/sharepoint/v3/contenttype/forms"/>
-  </ds:schemaRefs>
-</ds:datastoreItem>
+<file path=customXml/item3.xml><?xml version="1.0" encoding="utf-8"?>
+<?mso-contentType ?>
+<FormTemplates xmlns="http://schemas.microsoft.com/sharepoint/v3/contenttype/forms">
+  <Display>DocumentLibraryForm</Display>
+  <Edit>DocumentLibraryForm</Edit>
+  <New>DocumentLibraryForm</New>
+</FormTemplates>
 </file>
 
-<file path=customXml/itemProps2.xml><?xml version="1.0" encoding="utf-8"?>
+<file path=customXml/itemProps1.xml><?xml version="1.0" encoding="utf-8"?>
 <ds:datastoreItem xmlns:ds="http://schemas.openxmlformats.org/officeDocument/2006/customXml" ds:itemID="{E8DB7DEB-074E-4EE8-9B6E-FD277323109C}">
   <ds:schemaRefs>
     <ds:schemaRef ds:uri="http://schemas.microsoft.com/office/2006/metadata/contentType"/>
@@ -32283,7 +32275,7 @@
 </ds:datastoreItem>
 </file>
 
-<file path=customXml/itemProps3.xml><?xml version="1.0" encoding="utf-8"?>
+<file path=customXml/itemProps2.xml><?xml version="1.0" encoding="utf-8"?>
 <ds:datastoreItem xmlns:ds="http://schemas.openxmlformats.org/officeDocument/2006/customXml" ds:itemID="{A50EC660-24D0-43A0-AE5E-E274115E726B}">
   <ds:schemaRefs>
     <ds:schemaRef ds:uri="http://purl.org/dc/elements/1.1/"/>
@@ -32296,4 +32288,12 @@
     <ds:schemaRef ds:uri="http://schemas.microsoft.com/office/infopath/2007/PartnerControls"/>
   </ds:schemaRefs>
 </ds:datastoreItem>
+</file>
+
+<file path=customXml/itemProps3.xml><?xml version="1.0" encoding="utf-8"?>
+<ds:datastoreItem xmlns:ds="http://schemas.openxmlformats.org/officeDocument/2006/customXml" ds:itemID="{19E20559-B232-4371-8690-E3D8007EDB82}">
+  <ds:schemaRefs>
+    <ds:schemaRef ds:uri="http://schemas.microsoft.com/sharepoint/v3/contenttype/forms"/>
+  </ds:schemaRefs>
+</ds:datastoreItem>
 </file>
</xml_diff>

<commit_message>
Changes to refactoring, reproducibility, and summary
  * refactoring:
    "the running example" ~> "bssw-tutorial/hello-numerical world"
  * reproducibility:
    - added Theta and Rigetti images
    - changed SAND/NAS report links on slide 4 to DOI-s
  * summary: moved "CI" from "learned today" to "learn tomorrow"
</commit_message>
<xml_diff>
--- a/refactoring.pptx
+++ b/refactoring.pptx
@@ -294,7 +294,7 @@
           <a:p>
             <a:fld id="{0B842F42-2CE9-4E35-95C1-410DC08A50B1}" type="datetimeFigureOut">
               <a:rPr lang="en-US" smtClean="0"/>
-              <a:t>3/25/2022</a:t>
+              <a:t>4/1/22</a:t>
             </a:fld>
             <a:endParaRPr lang="en-US"/>
           </a:p>
@@ -459,7 +459,7 @@
           <a:p>
             <a:fld id="{6F282904-F315-4730-8D91-37D99E141A6F}" type="datetimeFigureOut">
               <a:rPr lang="en-US" smtClean="0"/>
-              <a:t>3/25/2022</a:t>
+              <a:t>4/1/22</a:t>
             </a:fld>
             <a:endParaRPr lang="en-US"/>
           </a:p>
@@ -7103,7 +7103,29 @@
           <a:p>
             <a:r>
               <a:rPr lang="en-US" dirty="0"/>
-              <a:t>Exercise: Refactoring the Running Example</a:t>
+              <a:t>Exercise: </a:t>
+            </a:r>
+            <a:r>
+              <a:rPr lang="en-US" b="0" dirty="0"/>
+              <a:t>Refactoring</a:t>
+            </a:r>
+            <a:r>
+              <a:rPr lang="en-US" dirty="0"/>
+              <a:t> </a:t>
+            </a:r>
+            <a:r>
+              <a:rPr lang="en-US" b="0" dirty="0" err="1">
+                <a:latin typeface="Consolas" panose="020B0609020204030204" pitchFamily="49" charset="0"/>
+                <a:cs typeface="Consolas" panose="020B0609020204030204" pitchFamily="49" charset="0"/>
+              </a:rPr>
+              <a:t>bssw</a:t>
+            </a:r>
+            <a:r>
+              <a:rPr lang="en-US" b="0" dirty="0">
+                <a:latin typeface="Consolas" panose="020B0609020204030204" pitchFamily="49" charset="0"/>
+                <a:cs typeface="Consolas" panose="020B0609020204030204" pitchFamily="49" charset="0"/>
+              </a:rPr>
+              <a:t>-tutorial/hello-numerical-world</a:t>
             </a:r>
           </a:p>
         </p:txBody>
@@ -7126,8 +7148,8 @@
         </p:nvSpPr>
         <p:spPr>
           <a:xfrm>
-            <a:off x="409508" y="1004147"/>
-            <a:ext cx="11139025" cy="5176520"/>
+            <a:off x="409508" y="1510747"/>
+            <a:ext cx="11139025" cy="4669919"/>
           </a:xfrm>
         </p:spPr>
         <p:txBody>
@@ -7152,12 +7174,16 @@
           <a:p>
             <a:pPr lvl="1"/>
             <a:r>
-              <a:rPr lang="en-US"/>
-              <a:t>Think </a:t>
-            </a:r>
-            <a:r>
               <a:rPr lang="en-US" dirty="0"/>
-              <a:t>about how you want your final product to be and then go through the exercise of refactoring</a:t>
+              <a:t>Think about </a:t>
+            </a:r>
+            <a:r>
+              <a:rPr lang="en-US" i="1" dirty="0"/>
+              <a:t>how you want your final product to be organized</a:t>
+            </a:r>
+            <a:r>
+              <a:rPr lang="en-US" dirty="0"/>
+              <a:t> and then go through the exercise of refactoring</a:t>
             </a:r>
           </a:p>
           <a:p>
@@ -32203,12 +32229,6 @@
 </file>
 
 <file path=customXml/item1.xml><?xml version="1.0" encoding="utf-8"?>
-<p:properties xmlns:p="http://schemas.microsoft.com/office/2006/metadata/properties" xmlns:xsi="http://www.w3.org/2001/XMLSchema-instance" xmlns:pc="http://schemas.microsoft.com/office/infopath/2007/PartnerControls">
-  <documentManagement/>
-</p:properties>
-</file>
-
-<file path=customXml/item2.xml><?xml version="1.0" encoding="utf-8"?>
 <ct:contentTypeSchema xmlns:ct="http://schemas.microsoft.com/office/2006/metadata/contentType" xmlns:ma="http://schemas.microsoft.com/office/2006/metadata/properties/metaAttributes" ct:_="" ma:_="" ma:contentTypeName="Document" ma:contentTypeID="0x010100565464437F680748A68B85EB6594EA7D" ma:contentTypeVersion="0" ma:contentTypeDescription="Create a new document." ma:contentTypeScope="" ma:versionID="fe3f4dd58d5914c51cfc6deaa8ad845c">
   <xsd:schema xmlns:xsd="http://www.w3.org/2001/XMLSchema" xmlns:p="http://schemas.microsoft.com/office/2006/metadata/properties" targetNamespace="http://schemas.microsoft.com/office/2006/metadata/properties" ma:root="true" ma:fieldsID="4aeb20c0e3442673af7ee10786458764">
     <xsd:element name="properties">
@@ -32257,7 +32277,7 @@
 </ct:contentTypeSchema>
 </file>
 
-<file path=customXml/item3.xml><?xml version="1.0" encoding="utf-8"?>
+<file path=customXml/item2.xml><?xml version="1.0" encoding="utf-8"?>
 <?mso-contentType ?>
 <FormTemplates xmlns="http://schemas.microsoft.com/sharepoint/v3/contenttype/forms">
   <Display>DocumentLibraryForm</Display>
@@ -32266,22 +32286,13 @@
 </FormTemplates>
 </file>
 
-<file path=customXml/itemProps1.xml><?xml version="1.0" encoding="utf-8"?>
-<ds:datastoreItem xmlns:ds="http://schemas.openxmlformats.org/officeDocument/2006/customXml" ds:itemID="{A50EC660-24D0-43A0-AE5E-E274115E726B}">
-  <ds:schemaRefs>
-    <ds:schemaRef ds:uri="http://purl.org/dc/elements/1.1/"/>
-    <ds:schemaRef ds:uri="http://schemas.microsoft.com/office/2006/metadata/properties"/>
-    <ds:schemaRef ds:uri="http://purl.org/dc/terms/"/>
-    <ds:schemaRef ds:uri="http://schemas.openxmlformats.org/package/2006/metadata/core-properties"/>
-    <ds:schemaRef ds:uri="http://schemas.microsoft.com/office/2006/documentManagement/types"/>
-    <ds:schemaRef ds:uri="http://www.w3.org/XML/1998/namespace"/>
-    <ds:schemaRef ds:uri="http://purl.org/dc/dcmitype/"/>
-    <ds:schemaRef ds:uri="http://schemas.microsoft.com/office/infopath/2007/PartnerControls"/>
-  </ds:schemaRefs>
-</ds:datastoreItem>
+<file path=customXml/item3.xml><?xml version="1.0" encoding="utf-8"?>
+<p:properties xmlns:p="http://schemas.microsoft.com/office/2006/metadata/properties" xmlns:xsi="http://www.w3.org/2001/XMLSchema-instance" xmlns:pc="http://schemas.microsoft.com/office/infopath/2007/PartnerControls">
+  <documentManagement/>
+</p:properties>
 </file>
 
-<file path=customXml/itemProps2.xml><?xml version="1.0" encoding="utf-8"?>
+<file path=customXml/itemProps1.xml><?xml version="1.0" encoding="utf-8"?>
 <ds:datastoreItem xmlns:ds="http://schemas.openxmlformats.org/officeDocument/2006/customXml" ds:itemID="{E8DB7DEB-074E-4EE8-9B6E-FD277323109C}">
   <ds:schemaRefs>
     <ds:schemaRef ds:uri="http://schemas.microsoft.com/office/2006/metadata/contentType"/>
@@ -32296,10 +32307,25 @@
 </ds:datastoreItem>
 </file>
 
-<file path=customXml/itemProps3.xml><?xml version="1.0" encoding="utf-8"?>
+<file path=customXml/itemProps2.xml><?xml version="1.0" encoding="utf-8"?>
 <ds:datastoreItem xmlns:ds="http://schemas.openxmlformats.org/officeDocument/2006/customXml" ds:itemID="{19E20559-B232-4371-8690-E3D8007EDB82}">
   <ds:schemaRefs>
     <ds:schemaRef ds:uri="http://schemas.microsoft.com/sharepoint/v3/contenttype/forms"/>
   </ds:schemaRefs>
 </ds:datastoreItem>
+</file>
+
+<file path=customXml/itemProps3.xml><?xml version="1.0" encoding="utf-8"?>
+<ds:datastoreItem xmlns:ds="http://schemas.openxmlformats.org/officeDocument/2006/customXml" ds:itemID="{A50EC660-24D0-43A0-AE5E-E274115E726B}">
+  <ds:schemaRefs>
+    <ds:schemaRef ds:uri="http://purl.org/dc/elements/1.1/"/>
+    <ds:schemaRef ds:uri="http://schemas.microsoft.com/office/2006/metadata/properties"/>
+    <ds:schemaRef ds:uri="http://purl.org/dc/terms/"/>
+    <ds:schemaRef ds:uri="http://schemas.openxmlformats.org/package/2006/metadata/core-properties"/>
+    <ds:schemaRef ds:uri="http://schemas.microsoft.com/office/2006/documentManagement/types"/>
+    <ds:schemaRef ds:uri="http://www.w3.org/XML/1998/namespace"/>
+    <ds:schemaRef ds:uri="http://purl.org/dc/dcmitype/"/>
+    <ds:schemaRef ds:uri="http://schemas.microsoft.com/office/infopath/2007/PartnerControls"/>
+  </ds:schemaRefs>
+</ds:datastoreItem>
 </file>
</xml_diff>

<commit_message>
hid a few slides to reduce the time
</commit_message>
<xml_diff>
--- a/refactoring.pptx
+++ b/refactoring.pptx
@@ -295,7 +295,7 @@
           <a:p>
             <a:fld id="{0B842F42-2CE9-4E35-95C1-410DC08A50B1}" type="datetimeFigureOut">
               <a:rPr lang="en-US" smtClean="0"/>
-              <a:t>4/15/2023</a:t>
+              <a:t>7/25/23</a:t>
             </a:fld>
             <a:endParaRPr lang="en-US"/>
           </a:p>
@@ -460,7 +460,7 @@
           <a:p>
             <a:fld id="{6F282904-F315-4730-8D91-37D99E141A6F}" type="datetimeFigureOut">
               <a:rPr lang="en-US" smtClean="0"/>
-              <a:t>4/15/2023</a:t>
+              <a:t>7/25/23</a:t>
             </a:fld>
             <a:endParaRPr lang="en-US"/>
           </a:p>
@@ -7157,7 +7157,7 @@
         <p:spPr>
           <a:xfrm>
             <a:off x="409508" y="1510747"/>
-            <a:ext cx="11139025" cy="4669919"/>
+            <a:ext cx="11139025" cy="2902227"/>
           </a:xfrm>
         </p:spPr>
         <p:txBody>
@@ -7166,35 +7166,6 @@
           </a:bodyPr>
           <a:lstStyle/>
           <a:p>
-            <a:r>
-              <a:rPr lang="en-US" dirty="0"/>
-              <a:t>Convert </a:t>
-            </a:r>
-            <a:r>
-              <a:rPr lang="en-US" dirty="0" err="1"/>
-              <a:t>heatAll.C</a:t>
-            </a:r>
-            <a:r>
-              <a:rPr lang="en-US" dirty="0"/>
-              <a:t> to the cleaner version with reusable code.</a:t>
-            </a:r>
-          </a:p>
-          <a:p>
-            <a:pPr lvl="1"/>
-            <a:r>
-              <a:rPr lang="en-US" dirty="0"/>
-              <a:t>Think about </a:t>
-            </a:r>
-            <a:r>
-              <a:rPr lang="en-US" i="1" dirty="0"/>
-              <a:t>how you want your final product to be organized</a:t>
-            </a:r>
-            <a:r>
-              <a:rPr lang="en-US" dirty="0"/>
-              <a:t> and then go through the exercise of refactoring</a:t>
-            </a:r>
-          </a:p>
-          <a:p>
             <a:pPr lvl="1"/>
             <a:endParaRPr lang="en-US" dirty="0"/>
           </a:p>
@@ -7205,7 +7176,7 @@
           <a:p>
             <a:r>
               <a:rPr lang="en-US" dirty="0"/>
-              <a:t>Here as an example exercise, I am taking the clean solution and generalizing the </a:t>
+              <a:t>I am taking the clean solution and generalizing the </a:t>
             </a:r>
             <a:r>
               <a:rPr lang="en-US" dirty="0" err="1"/>
@@ -11050,7 +11021,7 @@
           <a:p>
             <a:r>
               <a:rPr lang="en-US" dirty="0"/>
-              <a:t>A Real World Example: FLASH to Flash-X</a:t>
+              <a:t>A Real-World Example: FLASH to Flash-X</a:t>
             </a:r>
           </a:p>
         </p:txBody>
@@ -12859,7 +12830,7 @@
 </file>
 
 <file path=ppt/slides/slide26.xml><?xml version="1.0" encoding="utf-8"?>
-<p:sld xmlns:a="http://schemas.openxmlformats.org/drawingml/2006/main" xmlns:r="http://schemas.openxmlformats.org/officeDocument/2006/relationships" xmlns:p="http://schemas.openxmlformats.org/presentationml/2006/main">
+<p:sld xmlns:a="http://schemas.openxmlformats.org/drawingml/2006/main" xmlns:r="http://schemas.openxmlformats.org/officeDocument/2006/relationships" xmlns:p="http://schemas.openxmlformats.org/presentationml/2006/main" show="0">
   <p:cSld>
     <p:spTree>
       <p:nvGrpSpPr>
@@ -14214,13 +14185,13 @@
   <p:clrMapOvr>
     <a:masterClrMapping/>
   </p:clrMapOvr>
-  <mc:AlternateContent xmlns:mc="http://schemas.openxmlformats.org/markup-compatibility/2006" xmlns:p14="http://schemas.microsoft.com/office/powerpoint/2010/main">
-    <mc:Choice Requires="p14">
+  <mc:AlternateContent xmlns:mc="http://schemas.openxmlformats.org/markup-compatibility/2006">
+    <mc:Choice xmlns:p14="http://schemas.microsoft.com/office/powerpoint/2010/main" Requires="p14">
       <p:transition p14:dur="250">
         <p:fade/>
       </p:transition>
     </mc:Choice>
-    <mc:Fallback xmlns="">
+    <mc:Fallback>
       <p:transition>
         <p:fade/>
       </p:transition>
@@ -14230,7 +14201,7 @@
 </file>
 
 <file path=ppt/slides/slide27.xml><?xml version="1.0" encoding="utf-8"?>
-<p:sld xmlns:a="http://schemas.openxmlformats.org/drawingml/2006/main" xmlns:r="http://schemas.openxmlformats.org/officeDocument/2006/relationships" xmlns:p="http://schemas.openxmlformats.org/presentationml/2006/main">
+<p:sld xmlns:a="http://schemas.openxmlformats.org/drawingml/2006/main" xmlns:r="http://schemas.openxmlformats.org/officeDocument/2006/relationships" xmlns:p="http://schemas.openxmlformats.org/presentationml/2006/main" show="0">
   <p:cSld>
     <p:spTree>
       <p:nvGrpSpPr>
@@ -16329,13 +16300,13 @@
   <p:clrMapOvr>
     <a:masterClrMapping/>
   </p:clrMapOvr>
-  <mc:AlternateContent xmlns:mc="http://schemas.openxmlformats.org/markup-compatibility/2006" xmlns:p14="http://schemas.microsoft.com/office/powerpoint/2010/main">
-    <mc:Choice Requires="p14">
+  <mc:AlternateContent xmlns:mc="http://schemas.openxmlformats.org/markup-compatibility/2006">
+    <mc:Choice xmlns:p14="http://schemas.microsoft.com/office/powerpoint/2010/main" Requires="p14">
       <p:transition p14:dur="250">
         <p:fade/>
       </p:transition>
     </mc:Choice>
-    <mc:Fallback xmlns="">
+    <mc:Fallback>
       <p:transition>
         <p:fade/>
       </p:transition>
@@ -16345,7 +16316,7 @@
 </file>
 
 <file path=ppt/slides/slide28.xml><?xml version="1.0" encoding="utf-8"?>
-<p:sld xmlns:a="http://schemas.openxmlformats.org/drawingml/2006/main" xmlns:r="http://schemas.openxmlformats.org/officeDocument/2006/relationships" xmlns:p="http://schemas.openxmlformats.org/presentationml/2006/main">
+<p:sld xmlns:a="http://schemas.openxmlformats.org/drawingml/2006/main" xmlns:r="http://schemas.openxmlformats.org/officeDocument/2006/relationships" xmlns:p="http://schemas.openxmlformats.org/presentationml/2006/main" show="0">
   <p:cSld>
     <p:spTree>
       <p:nvGrpSpPr>
@@ -16834,13 +16805,13 @@
   <p:clrMapOvr>
     <a:masterClrMapping/>
   </p:clrMapOvr>
-  <mc:AlternateContent xmlns:mc="http://schemas.openxmlformats.org/markup-compatibility/2006" xmlns:p14="http://schemas.microsoft.com/office/powerpoint/2010/main">
-    <mc:Choice Requires="p14">
+  <mc:AlternateContent xmlns:mc="http://schemas.openxmlformats.org/markup-compatibility/2006">
+    <mc:Choice xmlns:p14="http://schemas.microsoft.com/office/powerpoint/2010/main" Requires="p14">
       <p:transition p14:dur="250">
         <p:fade/>
       </p:transition>
     </mc:Choice>
-    <mc:Fallback xmlns="">
+    <mc:Fallback>
       <p:transition>
         <p:fade/>
       </p:transition>
@@ -16850,7 +16821,7 @@
 </file>
 
 <file path=ppt/slides/slide29.xml><?xml version="1.0" encoding="utf-8"?>
-<p:sld xmlns:a="http://schemas.openxmlformats.org/drawingml/2006/main" xmlns:r="http://schemas.openxmlformats.org/officeDocument/2006/relationships" xmlns:p="http://schemas.openxmlformats.org/presentationml/2006/main">
+<p:sld xmlns:a="http://schemas.openxmlformats.org/drawingml/2006/main" xmlns:r="http://schemas.openxmlformats.org/officeDocument/2006/relationships" xmlns:p="http://schemas.openxmlformats.org/presentationml/2006/main" show="0">
   <p:cSld>
     <p:spTree>
       <p:nvGrpSpPr>
@@ -17820,7 +17791,7 @@
 </file>
 
 <file path=ppt/slides/slide30.xml><?xml version="1.0" encoding="utf-8"?>
-<p:sld xmlns:a="http://schemas.openxmlformats.org/drawingml/2006/main" xmlns:r="http://schemas.openxmlformats.org/officeDocument/2006/relationships" xmlns:p="http://schemas.openxmlformats.org/presentationml/2006/main">
+<p:sld xmlns:a="http://schemas.openxmlformats.org/drawingml/2006/main" xmlns:r="http://schemas.openxmlformats.org/officeDocument/2006/relationships" xmlns:p="http://schemas.openxmlformats.org/presentationml/2006/main" show="0">
   <p:cSld>
     <p:spTree>
       <p:nvGrpSpPr>
@@ -18716,13 +18687,13 @@
   <p:clrMapOvr>
     <a:masterClrMapping/>
   </p:clrMapOvr>
-  <mc:AlternateContent xmlns:mc="http://schemas.openxmlformats.org/markup-compatibility/2006" xmlns:p14="http://schemas.microsoft.com/office/powerpoint/2010/main">
-    <mc:Choice Requires="p14">
+  <mc:AlternateContent xmlns:mc="http://schemas.openxmlformats.org/markup-compatibility/2006">
+    <mc:Choice xmlns:p14="http://schemas.microsoft.com/office/powerpoint/2010/main" Requires="p14">
       <p:transition p14:dur="250">
         <p:fade/>
       </p:transition>
     </mc:Choice>
-    <mc:Fallback xmlns="">
+    <mc:Fallback>
       <p:transition>
         <p:fade/>
       </p:transition>
@@ -18732,7 +18703,7 @@
 </file>
 
 <file path=ppt/slides/slide31.xml><?xml version="1.0" encoding="utf-8"?>
-<p:sld xmlns:a="http://schemas.openxmlformats.org/drawingml/2006/main" xmlns:r="http://schemas.openxmlformats.org/officeDocument/2006/relationships" xmlns:p="http://schemas.openxmlformats.org/presentationml/2006/main">
+<p:sld xmlns:a="http://schemas.openxmlformats.org/drawingml/2006/main" xmlns:r="http://schemas.openxmlformats.org/officeDocument/2006/relationships" xmlns:p="http://schemas.openxmlformats.org/presentationml/2006/main" show="0">
   <p:cSld>
     <p:spTree>
       <p:nvGrpSpPr>
@@ -20025,13 +19996,13 @@
   <p:clrMapOvr>
     <a:masterClrMapping/>
   </p:clrMapOvr>
-  <mc:AlternateContent xmlns:mc="http://schemas.openxmlformats.org/markup-compatibility/2006" xmlns:p14="http://schemas.microsoft.com/office/powerpoint/2010/main">
-    <mc:Choice Requires="p14">
+  <mc:AlternateContent xmlns:mc="http://schemas.openxmlformats.org/markup-compatibility/2006">
+    <mc:Choice xmlns:p14="http://schemas.microsoft.com/office/powerpoint/2010/main" Requires="p14">
       <p:transition p14:dur="250">
         <p:fade/>
       </p:transition>
     </mc:Choice>
-    <mc:Fallback xmlns="">
+    <mc:Fallback>
       <p:transition>
         <p:fade/>
       </p:transition>
@@ -20041,7 +20012,7 @@
 </file>
 
 <file path=ppt/slides/slide32.xml><?xml version="1.0" encoding="utf-8"?>
-<p:sld xmlns:a="http://schemas.openxmlformats.org/drawingml/2006/main" xmlns:r="http://schemas.openxmlformats.org/officeDocument/2006/relationships" xmlns:p="http://schemas.openxmlformats.org/presentationml/2006/main">
+<p:sld xmlns:a="http://schemas.openxmlformats.org/drawingml/2006/main" xmlns:r="http://schemas.openxmlformats.org/officeDocument/2006/relationships" xmlns:p="http://schemas.openxmlformats.org/presentationml/2006/main" show="0">
   <p:cSld>
     <p:spTree>
       <p:nvGrpSpPr>
@@ -22128,13 +22099,13 @@
   <p:clrMapOvr>
     <a:masterClrMapping/>
   </p:clrMapOvr>
-  <mc:AlternateContent xmlns:mc="http://schemas.openxmlformats.org/markup-compatibility/2006" xmlns:p14="http://schemas.microsoft.com/office/powerpoint/2010/main">
-    <mc:Choice Requires="p14">
+  <mc:AlternateContent xmlns:mc="http://schemas.openxmlformats.org/markup-compatibility/2006">
+    <mc:Choice xmlns:p14="http://schemas.microsoft.com/office/powerpoint/2010/main" Requires="p14">
       <p:transition p14:dur="250">
         <p:fade/>
       </p:transition>
     </mc:Choice>
-    <mc:Fallback xmlns="">
+    <mc:Fallback>
       <p:transition>
         <p:fade/>
       </p:transition>
@@ -22144,7 +22115,7 @@
 </file>
 
 <file path=ppt/slides/slide33.xml><?xml version="1.0" encoding="utf-8"?>
-<p:sld xmlns:a="http://schemas.openxmlformats.org/drawingml/2006/main" xmlns:r="http://schemas.openxmlformats.org/officeDocument/2006/relationships" xmlns:p="http://schemas.openxmlformats.org/presentationml/2006/main">
+<p:sld xmlns:a="http://schemas.openxmlformats.org/drawingml/2006/main" xmlns:r="http://schemas.openxmlformats.org/officeDocument/2006/relationships" xmlns:p="http://schemas.openxmlformats.org/presentationml/2006/main" show="0">
   <p:cSld>
     <p:spTree>
       <p:nvGrpSpPr>
@@ -25015,13 +24986,13 @@
   <p:clrMapOvr>
     <a:masterClrMapping/>
   </p:clrMapOvr>
-  <mc:AlternateContent xmlns:mc="http://schemas.openxmlformats.org/markup-compatibility/2006" xmlns:p14="http://schemas.microsoft.com/office/powerpoint/2010/main">
-    <mc:Choice Requires="p14">
+  <mc:AlternateContent xmlns:mc="http://schemas.openxmlformats.org/markup-compatibility/2006">
+    <mc:Choice xmlns:p14="http://schemas.microsoft.com/office/powerpoint/2010/main" Requires="p14">
       <p:transition p14:dur="250">
         <p:fade/>
       </p:transition>
     </mc:Choice>
-    <mc:Fallback xmlns="">
+    <mc:Fallback>
       <p:transition>
         <p:fade/>
       </p:transition>
@@ -32758,21 +32729,12 @@
 </file>
 
 <file path=customXml/item1.xml><?xml version="1.0" encoding="utf-8"?>
-<?mso-contentType ?>
-<FormTemplates xmlns="http://schemas.microsoft.com/sharepoint/v3/contenttype/forms">
-  <Display>DocumentLibraryForm</Display>
-  <Edit>DocumentLibraryForm</Edit>
-  <New>DocumentLibraryForm</New>
-</FormTemplates>
-</file>
-
-<file path=customXml/item2.xml><?xml version="1.0" encoding="utf-8"?>
 <p:properties xmlns:p="http://schemas.microsoft.com/office/2006/metadata/properties" xmlns:xsi="http://www.w3.org/2001/XMLSchema-instance" xmlns:pc="http://schemas.microsoft.com/office/infopath/2007/PartnerControls">
   <documentManagement/>
 </p:properties>
 </file>
 
-<file path=customXml/item3.xml><?xml version="1.0" encoding="utf-8"?>
+<file path=customXml/item2.xml><?xml version="1.0" encoding="utf-8"?>
 <ct:contentTypeSchema xmlns:ct="http://schemas.microsoft.com/office/2006/metadata/contentType" xmlns:ma="http://schemas.microsoft.com/office/2006/metadata/properties/metaAttributes" ct:_="" ma:_="" ma:contentTypeName="Document" ma:contentTypeID="0x010100565464437F680748A68B85EB6594EA7D" ma:contentTypeVersion="0" ma:contentTypeDescription="Create a new document." ma:contentTypeScope="" ma:versionID="fe3f4dd58d5914c51cfc6deaa8ad845c">
   <xsd:schema xmlns:xsd="http://www.w3.org/2001/XMLSchema" xmlns:p="http://schemas.microsoft.com/office/2006/metadata/properties" targetNamespace="http://schemas.microsoft.com/office/2006/metadata/properties" ma:root="true" ma:fieldsID="4aeb20c0e3442673af7ee10786458764">
     <xsd:element name="properties">
@@ -32821,15 +32783,16 @@
 </ct:contentTypeSchema>
 </file>
 
-<file path=customXml/itemProps1.xml><?xml version="1.0" encoding="utf-8"?>
-<ds:datastoreItem xmlns:ds="http://schemas.openxmlformats.org/officeDocument/2006/customXml" ds:itemID="{19E20559-B232-4371-8690-E3D8007EDB82}">
-  <ds:schemaRefs>
-    <ds:schemaRef ds:uri="http://schemas.microsoft.com/sharepoint/v3/contenttype/forms"/>
-  </ds:schemaRefs>
-</ds:datastoreItem>
+<file path=customXml/item3.xml><?xml version="1.0" encoding="utf-8"?>
+<?mso-contentType ?>
+<FormTemplates xmlns="http://schemas.microsoft.com/sharepoint/v3/contenttype/forms">
+  <Display>DocumentLibraryForm</Display>
+  <Edit>DocumentLibraryForm</Edit>
+  <New>DocumentLibraryForm</New>
+</FormTemplates>
 </file>
 
-<file path=customXml/itemProps2.xml><?xml version="1.0" encoding="utf-8"?>
+<file path=customXml/itemProps1.xml><?xml version="1.0" encoding="utf-8"?>
 <ds:datastoreItem xmlns:ds="http://schemas.openxmlformats.org/officeDocument/2006/customXml" ds:itemID="{A50EC660-24D0-43A0-AE5E-E274115E726B}">
   <ds:schemaRefs>
     <ds:schemaRef ds:uri="http://purl.org/dc/elements/1.1/"/>
@@ -32844,7 +32807,7 @@
 </ds:datastoreItem>
 </file>
 
-<file path=customXml/itemProps3.xml><?xml version="1.0" encoding="utf-8"?>
+<file path=customXml/itemProps2.xml><?xml version="1.0" encoding="utf-8"?>
 <ds:datastoreItem xmlns:ds="http://schemas.openxmlformats.org/officeDocument/2006/customXml" ds:itemID="{E8DB7DEB-074E-4EE8-9B6E-FD277323109C}">
   <ds:schemaRefs>
     <ds:schemaRef ds:uri="http://schemas.microsoft.com/office/2006/metadata/contentType"/>
@@ -32857,4 +32820,12 @@
     <ds:schemaRef ds:uri="http://schemas.microsoft.com/office/internal/2005/internalDocumentation"/>
   </ds:schemaRefs>
 </ds:datastoreItem>
+</file>
+
+<file path=customXml/itemProps3.xml><?xml version="1.0" encoding="utf-8"?>
+<ds:datastoreItem xmlns:ds="http://schemas.openxmlformats.org/officeDocument/2006/customXml" ds:itemID="{19E20559-B232-4371-8690-E3D8007EDB82}">
+  <ds:schemaRefs>
+    <ds:schemaRef ds:uri="http://schemas.microsoft.com/sharepoint/v3/contenttype/forms"/>
+  </ds:schemaRefs>
+</ds:datastoreItem>
 </file>
</xml_diff>